<commit_message>
figure updates for revision
</commit_message>
<xml_diff>
--- a/figures/figure_01.pptx
+++ b/figures/figure_01.pptx
@@ -115,9 +115,62 @@
 <file path=ppt/revisionInfo.xml><?xml version="1.0" encoding="utf-8"?>
 <p1510:revInfo xmlns:a="http://schemas.openxmlformats.org/drawingml/2006/main" xmlns:r="http://schemas.openxmlformats.org/officeDocument/2006/relationships" xmlns:p1510="http://schemas.microsoft.com/office/powerpoint/2015/10/main">
   <p1510:revLst>
-    <p1510:client id="{2FEE633F-B714-452C-9C0E-785EF5ED778C}" v="24" dt="2023-11-29T21:05:17.078"/>
+    <p1510:client id="{013A01A5-DFAD-4991-A916-5DC0CDBB006D}" v="1" dt="2024-08-23T17:06:40.338"/>
   </p1510:revLst>
 </p1510:revInfo>
+</file>
+
+<file path=ppt/changesInfos/changesInfo1.xml><?xml version="1.0" encoding="utf-8"?>
+<pc:chgInfo xmlns:a="http://schemas.openxmlformats.org/drawingml/2006/main" xmlns:r="http://schemas.openxmlformats.org/officeDocument/2006/relationships" xmlns:ac="http://schemas.microsoft.com/office/drawing/2013/main/command" xmlns:pc="http://schemas.microsoft.com/office/powerpoint/2013/main/command">
+  <pc:docChgLst>
+    <pc:chgData name="Neil Gilbert" userId="2403ec6af305d8db" providerId="LiveId" clId="{013A01A5-DFAD-4991-A916-5DC0CDBB006D}"/>
+    <pc:docChg chg="custSel modSld">
+      <pc:chgData name="Neil Gilbert" userId="2403ec6af305d8db" providerId="LiveId" clId="{013A01A5-DFAD-4991-A916-5DC0CDBB006D}" dt="2024-08-23T17:08:31.206" v="33" actId="1076"/>
+      <pc:docMkLst>
+        <pc:docMk/>
+      </pc:docMkLst>
+      <pc:sldChg chg="addSp delSp modSp mod">
+        <pc:chgData name="Neil Gilbert" userId="2403ec6af305d8db" providerId="LiveId" clId="{013A01A5-DFAD-4991-A916-5DC0CDBB006D}" dt="2024-08-23T17:08:31.206" v="33" actId="1076"/>
+        <pc:sldMkLst>
+          <pc:docMk/>
+          <pc:sldMk cId="1744049387" sldId="256"/>
+        </pc:sldMkLst>
+        <pc:spChg chg="add mod ord">
+          <ac:chgData name="Neil Gilbert" userId="2403ec6af305d8db" providerId="LiveId" clId="{013A01A5-DFAD-4991-A916-5DC0CDBB006D}" dt="2024-08-23T17:08:31.206" v="33" actId="1076"/>
+          <ac:spMkLst>
+            <pc:docMk/>
+            <pc:sldMk cId="1744049387" sldId="256"/>
+            <ac:spMk id="8" creationId="{53D37700-B224-96CA-7C6D-F9C2F937670A}"/>
+          </ac:spMkLst>
+        </pc:spChg>
+        <pc:picChg chg="add mod ord">
+          <ac:chgData name="Neil Gilbert" userId="2403ec6af305d8db" providerId="LiveId" clId="{013A01A5-DFAD-4991-A916-5DC0CDBB006D}" dt="2024-08-23T17:06:51.067" v="16" actId="1035"/>
+          <ac:picMkLst>
+            <pc:docMk/>
+            <pc:sldMk cId="1744049387" sldId="256"/>
+            <ac:picMk id="3" creationId="{DFF1D1EB-E99C-EF3C-C20B-7DE82E5F8FC2}"/>
+          </ac:picMkLst>
+        </pc:picChg>
+        <pc:picChg chg="del">
+          <ac:chgData name="Neil Gilbert" userId="2403ec6af305d8db" providerId="LiveId" clId="{013A01A5-DFAD-4991-A916-5DC0CDBB006D}" dt="2024-08-23T17:06:36.316" v="0" actId="478"/>
+          <ac:picMkLst>
+            <pc:docMk/>
+            <pc:sldMk cId="1744049387" sldId="256"/>
+            <ac:picMk id="15" creationId="{4BB97E06-95EE-5CEA-AFB5-10D1B31A6C0F}"/>
+          </ac:picMkLst>
+        </pc:picChg>
+        <pc:cxnChg chg="add mod">
+          <ac:chgData name="Neil Gilbert" userId="2403ec6af305d8db" providerId="LiveId" clId="{013A01A5-DFAD-4991-A916-5DC0CDBB006D}" dt="2024-08-23T17:08:19.689" v="31" actId="692"/>
+          <ac:cxnSpMkLst>
+            <pc:docMk/>
+            <pc:sldMk cId="1744049387" sldId="256"/>
+            <ac:cxnSpMk id="18" creationId="{6BB6E427-8496-8176-442C-4C6BD507D00B}"/>
+          </ac:cxnSpMkLst>
+        </pc:cxnChg>
+      </pc:sldChg>
+    </pc:docChg>
+  </pc:docChgLst>
+</pc:chgInfo>
 </file>
 
 <file path=ppt/slideLayouts/slideLayout1.xml><?xml version="1.0" encoding="utf-8"?>
@@ -251,7 +304,7 @@
           <a:p>
             <a:fld id="{7BD586FD-CDE9-42FE-BAD6-E137B63216DE}" type="datetimeFigureOut">
               <a:rPr lang="en-US" smtClean="0"/>
-              <a:t>4/29/2024</a:t>
+              <a:t>8/23/2024</a:t>
             </a:fld>
             <a:endParaRPr lang="en-US"/>
           </a:p>
@@ -421,7 +474,7 @@
           <a:p>
             <a:fld id="{7BD586FD-CDE9-42FE-BAD6-E137B63216DE}" type="datetimeFigureOut">
               <a:rPr lang="en-US" smtClean="0"/>
-              <a:t>4/29/2024</a:t>
+              <a:t>8/23/2024</a:t>
             </a:fld>
             <a:endParaRPr lang="en-US"/>
           </a:p>
@@ -601,7 +654,7 @@
           <a:p>
             <a:fld id="{7BD586FD-CDE9-42FE-BAD6-E137B63216DE}" type="datetimeFigureOut">
               <a:rPr lang="en-US" smtClean="0"/>
-              <a:t>4/29/2024</a:t>
+              <a:t>8/23/2024</a:t>
             </a:fld>
             <a:endParaRPr lang="en-US"/>
           </a:p>
@@ -771,7 +824,7 @@
           <a:p>
             <a:fld id="{7BD586FD-CDE9-42FE-BAD6-E137B63216DE}" type="datetimeFigureOut">
               <a:rPr lang="en-US" smtClean="0"/>
-              <a:t>4/29/2024</a:t>
+              <a:t>8/23/2024</a:t>
             </a:fld>
             <a:endParaRPr lang="en-US"/>
           </a:p>
@@ -1017,7 +1070,7 @@
           <a:p>
             <a:fld id="{7BD586FD-CDE9-42FE-BAD6-E137B63216DE}" type="datetimeFigureOut">
               <a:rPr lang="en-US" smtClean="0"/>
-              <a:t>4/29/2024</a:t>
+              <a:t>8/23/2024</a:t>
             </a:fld>
             <a:endParaRPr lang="en-US"/>
           </a:p>
@@ -1249,7 +1302,7 @@
           <a:p>
             <a:fld id="{7BD586FD-CDE9-42FE-BAD6-E137B63216DE}" type="datetimeFigureOut">
               <a:rPr lang="en-US" smtClean="0"/>
-              <a:t>4/29/2024</a:t>
+              <a:t>8/23/2024</a:t>
             </a:fld>
             <a:endParaRPr lang="en-US"/>
           </a:p>
@@ -1616,7 +1669,7 @@
           <a:p>
             <a:fld id="{7BD586FD-CDE9-42FE-BAD6-E137B63216DE}" type="datetimeFigureOut">
               <a:rPr lang="en-US" smtClean="0"/>
-              <a:t>4/29/2024</a:t>
+              <a:t>8/23/2024</a:t>
             </a:fld>
             <a:endParaRPr lang="en-US"/>
           </a:p>
@@ -1734,7 +1787,7 @@
           <a:p>
             <a:fld id="{7BD586FD-CDE9-42FE-BAD6-E137B63216DE}" type="datetimeFigureOut">
               <a:rPr lang="en-US" smtClean="0"/>
-              <a:t>4/29/2024</a:t>
+              <a:t>8/23/2024</a:t>
             </a:fld>
             <a:endParaRPr lang="en-US"/>
           </a:p>
@@ -1829,7 +1882,7 @@
           <a:p>
             <a:fld id="{7BD586FD-CDE9-42FE-BAD6-E137B63216DE}" type="datetimeFigureOut">
               <a:rPr lang="en-US" smtClean="0"/>
-              <a:t>4/29/2024</a:t>
+              <a:t>8/23/2024</a:t>
             </a:fld>
             <a:endParaRPr lang="en-US"/>
           </a:p>
@@ -2106,7 +2159,7 @@
           <a:p>
             <a:fld id="{7BD586FD-CDE9-42FE-BAD6-E137B63216DE}" type="datetimeFigureOut">
               <a:rPr lang="en-US" smtClean="0"/>
-              <a:t>4/29/2024</a:t>
+              <a:t>8/23/2024</a:t>
             </a:fld>
             <a:endParaRPr lang="en-US"/>
           </a:p>
@@ -2363,7 +2416,7 @@
           <a:p>
             <a:fld id="{7BD586FD-CDE9-42FE-BAD6-E137B63216DE}" type="datetimeFigureOut">
               <a:rPr lang="en-US" smtClean="0"/>
-              <a:t>4/29/2024</a:t>
+              <a:t>8/23/2024</a:t>
             </a:fld>
             <a:endParaRPr lang="en-US"/>
           </a:p>
@@ -2576,7 +2629,7 @@
           <a:p>
             <a:fld id="{7BD586FD-CDE9-42FE-BAD6-E137B63216DE}" type="datetimeFigureOut">
               <a:rPr lang="en-US" smtClean="0"/>
-              <a:t>4/29/2024</a:t>
+              <a:t>8/23/2024</a:t>
             </a:fld>
             <a:endParaRPr lang="en-US"/>
           </a:p>
@@ -2983,10 +3036,10 @@
       </p:grpSpPr>
       <p:pic>
         <p:nvPicPr>
-          <p:cNvPr id="15" name="Picture 14" descr="A map of a field with a map of the united states&#10;&#10;Description automatically generated">
+          <p:cNvPr id="3" name="Picture 2" descr="A map of a field&#10;&#10;Description automatically generated">
             <a:extLst>
               <a:ext uri="{FF2B5EF4-FFF2-40B4-BE49-F238E27FC236}">
-                <a16:creationId xmlns:a16="http://schemas.microsoft.com/office/drawing/2014/main" id="{4BB97E06-95EE-5CEA-AFB5-10D1B31A6C0F}"/>
+                <a16:creationId xmlns:a16="http://schemas.microsoft.com/office/drawing/2014/main" id="{DFF1D1EB-E99C-EF3C-C20B-7DE82E5F8FC2}"/>
               </a:ext>
             </a:extLst>
           </p:cNvPr>
@@ -3009,7 +3062,7 @@
         </p:blipFill>
         <p:spPr>
           <a:xfrm>
-            <a:off x="22854" y="46458"/>
+            <a:off x="22854" y="62286"/>
             <a:ext cx="5440691" cy="3200407"/>
           </a:xfrm>
           <a:prstGeom prst="rect">
@@ -7945,6 +7998,109 @@
           </p:grpSp>
         </p:grpSp>
       </p:grpSp>
+      <p:cxnSp>
+        <p:nvCxnSpPr>
+          <p:cNvPr id="18" name="Straight Arrow Connector 17">
+            <a:extLst>
+              <a:ext uri="{FF2B5EF4-FFF2-40B4-BE49-F238E27FC236}">
+                <a16:creationId xmlns:a16="http://schemas.microsoft.com/office/drawing/2014/main" id="{6BB6E427-8496-8176-442C-4C6BD507D00B}"/>
+              </a:ext>
+            </a:extLst>
+          </p:cNvPr>
+          <p:cNvCxnSpPr>
+            <a:cxnSpLocks/>
+          </p:cNvCxnSpPr>
+          <p:nvPr/>
+        </p:nvCxnSpPr>
+        <p:spPr>
+          <a:xfrm flipV="1">
+            <a:off x="517055" y="249173"/>
+            <a:ext cx="0" cy="489076"/>
+          </a:xfrm>
+          <a:prstGeom prst="straightConnector1">
+            <a:avLst/>
+          </a:prstGeom>
+          <a:ln w="44450">
+            <a:solidFill>
+              <a:schemeClr val="tx1"/>
+            </a:solidFill>
+            <a:tailEnd type="triangle"/>
+          </a:ln>
+        </p:spPr>
+        <p:style>
+          <a:lnRef idx="1">
+            <a:schemeClr val="accent1"/>
+          </a:lnRef>
+          <a:fillRef idx="0">
+            <a:schemeClr val="accent1"/>
+          </a:fillRef>
+          <a:effectRef idx="0">
+            <a:schemeClr val="accent1"/>
+          </a:effectRef>
+          <a:fontRef idx="minor">
+            <a:schemeClr val="tx1"/>
+          </a:fontRef>
+        </p:style>
+      </p:cxnSp>
+      <p:sp>
+        <p:nvSpPr>
+          <p:cNvPr id="8" name="Rectangle 7">
+            <a:extLst>
+              <a:ext uri="{FF2B5EF4-FFF2-40B4-BE49-F238E27FC236}">
+                <a16:creationId xmlns:a16="http://schemas.microsoft.com/office/drawing/2014/main" id="{53D37700-B224-96CA-7C6D-F9C2F937670A}"/>
+              </a:ext>
+            </a:extLst>
+          </p:cNvPr>
+          <p:cNvSpPr/>
+          <p:nvPr/>
+        </p:nvSpPr>
+        <p:spPr>
+          <a:xfrm>
+            <a:off x="428966" y="410798"/>
+            <a:ext cx="191176" cy="248422"/>
+          </a:xfrm>
+          <a:prstGeom prst="rect">
+            <a:avLst/>
+          </a:prstGeom>
+          <a:solidFill>
+            <a:schemeClr val="bg1"/>
+          </a:solidFill>
+          <a:ln>
+            <a:noFill/>
+          </a:ln>
+        </p:spPr>
+        <p:style>
+          <a:lnRef idx="2">
+            <a:schemeClr val="accent1">
+              <a:shade val="15000"/>
+            </a:schemeClr>
+          </a:lnRef>
+          <a:fillRef idx="1">
+            <a:schemeClr val="accent1"/>
+          </a:fillRef>
+          <a:effectRef idx="0">
+            <a:schemeClr val="accent1"/>
+          </a:effectRef>
+          <a:fontRef idx="minor">
+            <a:schemeClr val="lt1"/>
+          </a:fontRef>
+        </p:style>
+        <p:txBody>
+          <a:bodyPr rtlCol="0" anchor="ctr"/>
+          <a:lstStyle/>
+          <a:p>
+            <a:pPr algn="ctr"/>
+            <a:r>
+              <a:rPr lang="en-US" dirty="0">
+                <a:solidFill>
+                  <a:schemeClr val="tx1"/>
+                </a:solidFill>
+              </a:rPr>
+              <a:t>N</a:t>
+            </a:r>
+          </a:p>
+        </p:txBody>
+      </p:sp>
     </p:spTree>
     <p:extLst>
       <p:ext uri="{BB962C8B-B14F-4D97-AF65-F5344CB8AC3E}">

</xml_diff>